<commit_message>
update to main presentation
</commit_message>
<xml_diff>
--- a/Machine_Learning_Presentation.pptx
+++ b/Machine_Learning_Presentation.pptx
@@ -535,7 +535,7 @@
           <a:p>
             <a:fld id="{18DCCD61-643D-44A5-A450-3A42A50CBC1E}" type="datetimeFigureOut">
               <a:rPr lang="en-US" smtClean="0"/>
-              <a:t>11/12/2020</a:t>
+              <a:t>11/13/2020</a:t>
             </a:fld>
             <a:endParaRPr lang="en-US"/>
           </a:p>
@@ -652,7 +652,7 @@
           <a:p>
             <a:fld id="{18DCCD61-643D-44A5-A450-3A42A50CBC1E}" type="datetimeFigureOut">
               <a:rPr lang="en-US" smtClean="0"/>
-              <a:t>11/12/2020</a:t>
+              <a:t>11/13/2020</a:t>
             </a:fld>
             <a:endParaRPr lang="en-US"/>
           </a:p>
@@ -747,7 +747,7 @@
           <a:p>
             <a:fld id="{18DCCD61-643D-44A5-A450-3A42A50CBC1E}" type="datetimeFigureOut">
               <a:rPr lang="en-US" smtClean="0"/>
-              <a:t>11/12/2020</a:t>
+              <a:t>11/13/2020</a:t>
             </a:fld>
             <a:endParaRPr lang="en-US"/>
           </a:p>
@@ -1022,7 +1022,7 @@
           <a:p>
             <a:fld id="{18DCCD61-643D-44A5-A450-3A42A50CBC1E}" type="datetimeFigureOut">
               <a:rPr lang="en-US" smtClean="0"/>
-              <a:t>11/12/2020</a:t>
+              <a:t>11/13/2020</a:t>
             </a:fld>
             <a:endParaRPr lang="en-US"/>
           </a:p>
@@ -1274,7 +1274,7 @@
           <a:p>
             <a:fld id="{18DCCD61-643D-44A5-A450-3A42A50CBC1E}" type="datetimeFigureOut">
               <a:rPr lang="en-US" smtClean="0"/>
-              <a:t>11/12/2020</a:t>
+              <a:t>11/13/2020</a:t>
             </a:fld>
             <a:endParaRPr lang="en-US"/>
           </a:p>
@@ -1442,7 +1442,7 @@
           <a:p>
             <a:fld id="{18DCCD61-643D-44A5-A450-3A42A50CBC1E}" type="datetimeFigureOut">
               <a:rPr lang="en-US" smtClean="0"/>
-              <a:t>11/12/2020</a:t>
+              <a:t>11/13/2020</a:t>
             </a:fld>
             <a:endParaRPr lang="en-US"/>
           </a:p>
@@ -1620,7 +1620,7 @@
           <a:p>
             <a:fld id="{18DCCD61-643D-44A5-A450-3A42A50CBC1E}" type="datetimeFigureOut">
               <a:rPr lang="en-US" smtClean="0"/>
-              <a:t>11/12/2020</a:t>
+              <a:t>11/13/2020</a:t>
             </a:fld>
             <a:endParaRPr lang="en-US"/>
           </a:p>
@@ -1902,7 +1902,7 @@
             <a:fld id="{53074F12-AA26-4AC8-9962-C36BB8F32554}" type="datetimeFigureOut">
               <a:rPr lang="en-US" smtClean="0"/>
               <a:pPr/>
-              <a:t>11/12/2020</a:t>
+              <a:t>11/13/2020</a:t>
             </a:fld>
             <a:endParaRPr lang="en-US"/>
           </a:p>
@@ -2137,7 +2137,7 @@
             <a:fld id="{53074F12-AA26-4AC8-9962-C36BB8F32554}" type="datetimeFigureOut">
               <a:rPr lang="en-US" smtClean="0"/>
               <a:pPr/>
-              <a:t>11/12/2020</a:t>
+              <a:t>11/13/2020</a:t>
             </a:fld>
             <a:endParaRPr lang="en-US"/>
           </a:p>
@@ -2386,7 +2386,7 @@
             <a:fld id="{53074F12-AA26-4AC8-9962-C36BB8F32554}" type="datetimeFigureOut">
               <a:rPr lang="en-US" smtClean="0"/>
               <a:pPr/>
-              <a:t>11/12/2020</a:t>
+              <a:t>11/13/2020</a:t>
             </a:fld>
             <a:endParaRPr lang="en-US"/>
           </a:p>
@@ -2811,7 +2811,7 @@
             <a:fld id="{53074F12-AA26-4AC8-9962-C36BB8F32554}" type="datetimeFigureOut">
               <a:rPr lang="en-US" smtClean="0"/>
               <a:pPr/>
-              <a:t>11/12/2020</a:t>
+              <a:t>11/13/2020</a:t>
             </a:fld>
             <a:endParaRPr lang="en-US"/>
           </a:p>
@@ -3098,7 +3098,7 @@
             <a:fld id="{53074F12-AA26-4AC8-9962-C36BB8F32554}" type="datetimeFigureOut">
               <a:rPr lang="en-US" smtClean="0"/>
               <a:pPr/>
-              <a:t>11/12/2020</a:t>
+              <a:t>11/13/2020</a:t>
             </a:fld>
             <a:endParaRPr lang="en-US"/>
           </a:p>
@@ -3587,7 +3587,7 @@
             <a:fld id="{53074F12-AA26-4AC8-9962-C36BB8F32554}" type="datetimeFigureOut">
               <a:rPr lang="en-US" smtClean="0"/>
               <a:pPr/>
-              <a:t>11/12/2020</a:t>
+              <a:t>11/13/2020</a:t>
             </a:fld>
             <a:endParaRPr lang="en-US"/>
           </a:p>
@@ -3706,7 +3706,7 @@
             <a:fld id="{53074F12-AA26-4AC8-9962-C36BB8F32554}" type="datetimeFigureOut">
               <a:rPr lang="en-US" smtClean="0"/>
               <a:pPr/>
-              <a:t>11/12/2020</a:t>
+              <a:t>11/13/2020</a:t>
             </a:fld>
             <a:endParaRPr lang="en-US"/>
           </a:p>
@@ -3803,7 +3803,7 @@
             <a:fld id="{53074F12-AA26-4AC8-9962-C36BB8F32554}" type="datetimeFigureOut">
               <a:rPr lang="en-US" smtClean="0"/>
               <a:pPr/>
-              <a:t>11/12/2020</a:t>
+              <a:t>11/13/2020</a:t>
             </a:fld>
             <a:endParaRPr lang="en-US"/>
           </a:p>
@@ -4080,7 +4080,7 @@
             <a:fld id="{53074F12-AA26-4AC8-9962-C36BB8F32554}" type="datetimeFigureOut">
               <a:rPr lang="en-US" smtClean="0"/>
               <a:pPr/>
-              <a:t>11/12/2020</a:t>
+              <a:t>11/13/2020</a:t>
             </a:fld>
             <a:endParaRPr lang="en-US"/>
           </a:p>
@@ -4334,7 +4334,7 @@
             <a:fld id="{53074F12-AA26-4AC8-9962-C36BB8F32554}" type="datetimeFigureOut">
               <a:rPr lang="en-US" smtClean="0"/>
               <a:pPr/>
-              <a:t>11/12/2020</a:t>
+              <a:t>11/13/2020</a:t>
             </a:fld>
             <a:endParaRPr lang="en-US"/>
           </a:p>
@@ -4504,7 +4504,7 @@
             <a:fld id="{53074F12-AA26-4AC8-9962-C36BB8F32554}" type="datetimeFigureOut">
               <a:rPr lang="en-US" smtClean="0"/>
               <a:pPr/>
-              <a:t>11/12/2020</a:t>
+              <a:t>11/13/2020</a:t>
             </a:fld>
             <a:endParaRPr lang="en-US"/>
           </a:p>
@@ -4684,7 +4684,7 @@
             <a:fld id="{53074F12-AA26-4AC8-9962-C36BB8F32554}" type="datetimeFigureOut">
               <a:rPr lang="en-US" smtClean="0"/>
               <a:pPr/>
-              <a:t>11/12/2020</a:t>
+              <a:t>11/13/2020</a:t>
             </a:fld>
             <a:endParaRPr lang="en-US"/>
           </a:p>
@@ -5192,7 +5192,7 @@
             <a:fld id="{53074F12-AA26-4AC8-9962-C36BB8F32554}" type="datetimeFigureOut">
               <a:rPr lang="en-US" smtClean="0"/>
               <a:pPr/>
-              <a:t>11/12/2020</a:t>
+              <a:t>11/13/2020</a:t>
             </a:fld>
             <a:endParaRPr lang="en-US"/>
           </a:p>
@@ -5441,7 +5441,7 @@
             <a:fld id="{53074F12-AA26-4AC8-9962-C36BB8F32554}" type="datetimeFigureOut">
               <a:rPr lang="en-US" smtClean="0"/>
               <a:pPr/>
-              <a:t>11/12/2020</a:t>
+              <a:t>11/13/2020</a:t>
             </a:fld>
             <a:endParaRPr lang="en-US"/>
           </a:p>
@@ -5682,7 +5682,7 @@
           <a:p>
             <a:fld id="{18DCCD61-643D-44A5-A450-3A42A50CBC1E}" type="datetimeFigureOut">
               <a:rPr lang="en-US" smtClean="0"/>
-              <a:t>11/12/2020</a:t>
+              <a:t>11/13/2020</a:t>
             </a:fld>
             <a:endParaRPr lang="en-US"/>
           </a:p>
@@ -5850,7 +5850,7 @@
           <a:p>
             <a:fld id="{18DCCD61-643D-44A5-A450-3A42A50CBC1E}" type="datetimeFigureOut">
               <a:rPr lang="en-US" smtClean="0"/>
-              <a:t>11/12/2020</a:t>
+              <a:t>11/13/2020</a:t>
             </a:fld>
             <a:endParaRPr lang="en-US"/>
           </a:p>
@@ -6095,7 +6095,7 @@
           <a:p>
             <a:fld id="{18DCCD61-643D-44A5-A450-3A42A50CBC1E}" type="datetimeFigureOut">
               <a:rPr lang="en-US" smtClean="0"/>
-              <a:t>11/12/2020</a:t>
+              <a:t>11/13/2020</a:t>
             </a:fld>
             <a:endParaRPr lang="en-US"/>
           </a:p>
@@ -6380,7 +6380,7 @@
           <a:p>
             <a:fld id="{18DCCD61-643D-44A5-A450-3A42A50CBC1E}" type="datetimeFigureOut">
               <a:rPr lang="en-US" smtClean="0"/>
-              <a:t>11/12/2020</a:t>
+              <a:t>11/13/2020</a:t>
             </a:fld>
             <a:endParaRPr lang="en-US"/>
           </a:p>
@@ -6884,7 +6884,7 @@
           <a:p>
             <a:fld id="{18DCCD61-643D-44A5-A450-3A42A50CBC1E}" type="datetimeFigureOut">
               <a:rPr lang="en-US" smtClean="0"/>
-              <a:t>11/12/2020</a:t>
+              <a:t>11/13/2020</a:t>
             </a:fld>
             <a:endParaRPr lang="en-US"/>
           </a:p>
@@ -7402,7 +7402,7 @@
             <a:fld id="{53074F12-AA26-4AC8-9962-C36BB8F32554}" type="datetimeFigureOut">
               <a:rPr lang="en-US" smtClean="0"/>
               <a:pPr/>
-              <a:t>11/12/2020</a:t>
+              <a:t>11/13/2020</a:t>
             </a:fld>
             <a:endParaRPr lang="en-US"/>
           </a:p>
@@ -8090,17 +8090,17 @@
           <a:lstStyle/>
           <a:p>
             <a:r>
-              <a:rPr lang="en-US" altLang="ko-KR" dirty="0"/>
+              <a:rPr lang="en-US" altLang="ko-KR" sz="3200" dirty="0"/>
               <a:t>What is Machine </a:t>
             </a:r>
             <a:br>
-              <a:rPr lang="en-US" altLang="ko-KR" dirty="0"/>
+              <a:rPr lang="en-US" altLang="ko-KR" sz="3200" dirty="0"/>
             </a:br>
             <a:r>
-              <a:rPr lang="en-US" altLang="ko-KR" dirty="0"/>
+              <a:rPr lang="en-US" altLang="ko-KR" sz="3200" dirty="0"/>
               <a:t>Learning?</a:t>
             </a:r>
-            <a:endParaRPr lang="en-US" dirty="0"/>
+            <a:endParaRPr lang="en-US" sz="3200" dirty="0"/>
           </a:p>
         </p:txBody>
       </p:sp>
@@ -8620,17 +8620,17 @@
           <a:lstStyle/>
           <a:p>
             <a:r>
-              <a:rPr lang="en-US" altLang="ko-KR" dirty="0"/>
+              <a:rPr lang="en-US" altLang="ko-KR" sz="3200" dirty="0"/>
               <a:t>Factors for Mortgage </a:t>
             </a:r>
             <a:br>
-              <a:rPr lang="en-US" altLang="ko-KR" dirty="0"/>
+              <a:rPr lang="en-US" altLang="ko-KR" sz="3200" dirty="0"/>
             </a:br>
             <a:r>
-              <a:rPr lang="en-US" altLang="ko-KR" dirty="0"/>
+              <a:rPr lang="en-US" altLang="ko-KR" sz="3200" dirty="0"/>
               <a:t>Qualification</a:t>
             </a:r>
-            <a:endParaRPr lang="en-US" dirty="0"/>
+            <a:endParaRPr lang="en-US" sz="3200" dirty="0"/>
           </a:p>
         </p:txBody>
       </p:sp>
@@ -8945,7 +8945,12 @@
             <p:ph type="title"/>
           </p:nvPr>
         </p:nvSpPr>
-        <p:spPr/>
+        <p:spPr>
+          <a:xfrm>
+            <a:off x="476819" y="229620"/>
+            <a:ext cx="6827643" cy="967132"/>
+          </a:xfrm>
+        </p:spPr>
         <p:txBody>
           <a:bodyPr>
             <a:normAutofit/>
@@ -8970,7 +8975,12 @@
             <p:ph idx="1"/>
           </p:nvPr>
         </p:nvSpPr>
-        <p:spPr/>
+        <p:spPr>
+          <a:xfrm>
+            <a:off x="476819" y="1196752"/>
+            <a:ext cx="6850625" cy="4825652"/>
+          </a:xfrm>
+        </p:spPr>
         <p:txBody>
           <a:bodyPr>
             <a:normAutofit/>
@@ -8985,25 +8995,11 @@
               <a:buChar char="•"/>
             </a:pPr>
             <a:r>
-              <a:rPr lang="en-US" altLang="ko-KR" sz="2400" dirty="0">
+              <a:rPr lang="en-US" altLang="ko-KR" sz="1800" dirty="0">
                 <a:latin typeface="Arial" panose="020B0604020202020204" pitchFamily="34" charset="0"/>
                 <a:cs typeface="Arial" pitchFamily="34" charset="0"/>
               </a:rPr>
-              <a:t>Review and clean data using </a:t>
-            </a:r>
-            <a:r>
-              <a:rPr lang="en-US" altLang="ko-KR" sz="2400" dirty="0" err="1">
-                <a:latin typeface="Arial" panose="020B0604020202020204" pitchFamily="34" charset="0"/>
-                <a:cs typeface="Arial" pitchFamily="34" charset="0"/>
-              </a:rPr>
-              <a:t>Jupyter</a:t>
-            </a:r>
-            <a:r>
-              <a:rPr lang="en-US" altLang="ko-KR" sz="2400" dirty="0">
-                <a:latin typeface="Arial" panose="020B0604020202020204" pitchFamily="34" charset="0"/>
-                <a:cs typeface="Arial" pitchFamily="34" charset="0"/>
-              </a:rPr>
-              <a:t> Lab</a:t>
+              <a:t>Find the best data for our model</a:t>
             </a:r>
           </a:p>
           <a:p>
@@ -9015,7 +9011,23 @@
               <a:buChar char="•"/>
             </a:pPr>
             <a:r>
-              <a:rPr lang="en-US" altLang="ko-KR" sz="2400" dirty="0">
+              <a:rPr lang="en-US" altLang="ko-KR" sz="1800" dirty="0">
+                <a:latin typeface="Arial" panose="020B0604020202020204" pitchFamily="34" charset="0"/>
+                <a:cs typeface="Arial" pitchFamily="34" charset="0"/>
+              </a:rPr>
+              <a:t>Review and clean data using Jupyter Lab</a:t>
+            </a:r>
+          </a:p>
+          <a:p>
+            <a:pPr marL="285750" indent="-285750">
+              <a:lnSpc>
+                <a:spcPct val="150000"/>
+              </a:lnSpc>
+              <a:buFont typeface="Arial" panose="020B0604020202020204" pitchFamily="34" charset="0"/>
+              <a:buChar char="•"/>
+            </a:pPr>
+            <a:r>
+              <a:rPr lang="en-US" altLang="ko-KR" sz="1800" dirty="0">
                 <a:latin typeface="Arial" panose="020B0604020202020204" pitchFamily="34" charset="0"/>
                 <a:cs typeface="Arial" pitchFamily="34" charset="0"/>
               </a:rPr>
@@ -9137,7 +9149,7 @@
               <a:buChar char="•"/>
             </a:pPr>
             <a:r>
-              <a:rPr lang="en-US" altLang="ko-KR" sz="2800" dirty="0">
+              <a:rPr lang="en-US" altLang="ko-KR" sz="2400" dirty="0">
                 <a:latin typeface="Arial" pitchFamily="34" charset="0"/>
                 <a:cs typeface="Arial" pitchFamily="34" charset="0"/>
               </a:rPr>
@@ -9152,12 +9164,45 @@
               <a:buFont typeface="Arial" panose="020B0604020202020204" pitchFamily="34" charset="0"/>
               <a:buChar char="•"/>
             </a:pPr>
-            <a:r>
-              <a:rPr lang="en-US" altLang="ko-KR" sz="2800" dirty="0"/>
+            <a:endParaRPr lang="en-US" altLang="ko-KR" sz="2000" dirty="0"/>
+          </a:p>
+          <a:p>
+            <a:pPr marL="285750" indent="-285750">
+              <a:lnSpc>
+                <a:spcPct val="150000"/>
+              </a:lnSpc>
+              <a:buFont typeface="Arial" panose="020B0604020202020204" pitchFamily="34" charset="0"/>
+              <a:buChar char="•"/>
+            </a:pPr>
+            <a:endParaRPr lang="en-US" altLang="ko-KR" sz="2000" dirty="0"/>
+          </a:p>
+          <a:p>
+            <a:pPr marL="285750" indent="-285750">
+              <a:lnSpc>
+                <a:spcPct val="150000"/>
+              </a:lnSpc>
+              <a:buFont typeface="Arial" panose="020B0604020202020204" pitchFamily="34" charset="0"/>
+              <a:buChar char="•"/>
+            </a:pPr>
+            <a:endParaRPr lang="en-US" altLang="ko-KR" sz="2000" dirty="0"/>
+          </a:p>
+          <a:p>
+            <a:pPr marL="285750" indent="-285750">
+              <a:lnSpc>
+                <a:spcPct val="150000"/>
+              </a:lnSpc>
+              <a:buFont typeface="Arial" panose="020B0604020202020204" pitchFamily="34" charset="0"/>
+              <a:buChar char="•"/>
+            </a:pPr>
+            <a:r>
+              <a:rPr lang="en-US" altLang="ko-KR" sz="2400" dirty="0">
+                <a:latin typeface="Arial" panose="020B0604020202020204" pitchFamily="34" charset="0"/>
+                <a:cs typeface="Arial" panose="020B0604020202020204" pitchFamily="34" charset="0"/>
+              </a:rPr>
               <a:t>Plot data</a:t>
             </a:r>
-            <a:endParaRPr lang="ko-KR" altLang="en-US" sz="2800" dirty="0">
-              <a:latin typeface="Arial" pitchFamily="34" charset="0"/>
+            <a:endParaRPr lang="ko-KR" altLang="en-US" sz="2400" dirty="0">
+              <a:latin typeface="Arial" panose="020B0604020202020204" pitchFamily="34" charset="0"/>
               <a:cs typeface="Arial" pitchFamily="34" charset="0"/>
             </a:endParaRPr>
           </a:p>
@@ -9197,7 +9242,7 @@
         </p:blipFill>
         <p:spPr>
           <a:xfrm>
-            <a:off x="6101561" y="3495188"/>
+            <a:off x="6101561" y="4293096"/>
             <a:ext cx="2864859" cy="1864815"/>
           </a:xfrm>
           <a:prstGeom prst="rect">
@@ -9233,7 +9278,7 @@
         </p:blipFill>
         <p:spPr>
           <a:xfrm>
-            <a:off x="3095835" y="3495602"/>
+            <a:off x="3095835" y="4293510"/>
             <a:ext cx="2952329" cy="1858062"/>
           </a:xfrm>
           <a:prstGeom prst="rect">
@@ -9269,8 +9314,38 @@
         </p:blipFill>
         <p:spPr>
           <a:xfrm>
-            <a:off x="284036" y="3495602"/>
+            <a:off x="284036" y="4293510"/>
             <a:ext cx="2769148" cy="1858062"/>
+          </a:xfrm>
+          <a:prstGeom prst="rect">
+            <a:avLst/>
+          </a:prstGeom>
+        </p:spPr>
+      </p:pic>
+      <p:pic>
+        <p:nvPicPr>
+          <p:cNvPr id="4" name="Picture 3">
+            <a:extLst>
+              <a:ext uri="{FF2B5EF4-FFF2-40B4-BE49-F238E27FC236}">
+                <a16:creationId xmlns:a16="http://schemas.microsoft.com/office/drawing/2014/main" id="{20207B61-B003-4D06-9F3E-A57957C62B05}"/>
+              </a:ext>
+            </a:extLst>
+          </p:cNvPr>
+          <p:cNvPicPr>
+            <a:picLocks noChangeAspect="1"/>
+          </p:cNvPicPr>
+          <p:nvPr/>
+        </p:nvPicPr>
+        <p:blipFill>
+          <a:blip r:embed="rId5"/>
+          <a:stretch>
+            <a:fillRect/>
+          </a:stretch>
+        </p:blipFill>
+        <p:spPr>
+          <a:xfrm>
+            <a:off x="467544" y="2276872"/>
+            <a:ext cx="8245211" cy="929570"/>
           </a:xfrm>
           <a:prstGeom prst="rect">
             <a:avLst/>
@@ -9354,7 +9429,7 @@
               <a:buChar char="•"/>
             </a:pPr>
             <a:r>
-              <a:rPr lang="en-US" altLang="ko-KR" sz="3600" dirty="0">
+              <a:rPr lang="en-US" altLang="ko-KR" dirty="0">
                 <a:latin typeface="Arial" panose="020B0604020202020204" pitchFamily="34" charset="0"/>
                 <a:cs typeface="Arial" pitchFamily="34" charset="0"/>
               </a:rPr>
@@ -9370,7 +9445,7 @@
               <a:buChar char="•"/>
             </a:pPr>
             <a:r>
-              <a:rPr lang="en-US" altLang="ko-KR" sz="3600" dirty="0">
+              <a:rPr lang="en-US" altLang="ko-KR" dirty="0">
                 <a:latin typeface="Arial" panose="020B0604020202020204" pitchFamily="34" charset="0"/>
                 <a:cs typeface="Arial" pitchFamily="34" charset="0"/>
               </a:rPr>
@@ -9386,7 +9461,7 @@
               <a:buChar char="•"/>
             </a:pPr>
             <a:r>
-              <a:rPr lang="en-US" altLang="ko-KR" sz="3600" dirty="0">
+              <a:rPr lang="en-US" altLang="ko-KR" dirty="0">
                 <a:latin typeface="Arial" panose="020B0604020202020204" pitchFamily="34" charset="0"/>
                 <a:cs typeface="Arial" pitchFamily="34" charset="0"/>
               </a:rPr>
@@ -9500,29 +9575,7 @@
                 <a:latin typeface="Arial" panose="020B0604020202020204" pitchFamily="34" charset="0"/>
                 <a:cs typeface="Arial" panose="020B0604020202020204" pitchFamily="34" charset="0"/>
               </a:rPr>
-              <a:t>Matplotlib/</a:t>
-            </a:r>
-            <a:r>
-              <a:rPr lang="en-US" sz="2800" b="0" i="0" dirty="0" err="1">
-                <a:solidFill>
-                  <a:srgbClr val="212529"/>
-                </a:solidFill>
-                <a:effectLst/>
-                <a:latin typeface="Arial" panose="020B0604020202020204" pitchFamily="34" charset="0"/>
-                <a:cs typeface="Arial" panose="020B0604020202020204" pitchFamily="34" charset="0"/>
-              </a:rPr>
-              <a:t>Numpy</a:t>
-            </a:r>
-            <a:r>
-              <a:rPr lang="en-US" sz="2800" b="0" i="0" dirty="0">
-                <a:solidFill>
-                  <a:srgbClr val="212529"/>
-                </a:solidFill>
-                <a:effectLst/>
-                <a:latin typeface="Arial" panose="020B0604020202020204" pitchFamily="34" charset="0"/>
-                <a:cs typeface="Arial" panose="020B0604020202020204" pitchFamily="34" charset="0"/>
-              </a:rPr>
-              <a:t>/Seaborne</a:t>
+              <a:t>Matplotlib/Numpy/Seaborne</a:t>
             </a:r>
           </a:p>
           <a:p>
@@ -9613,7 +9666,7 @@
               <a:buChar char="•"/>
             </a:pPr>
             <a:r>
-              <a:rPr lang="en-US" sz="2800" b="0" i="0" dirty="0" err="1">
+              <a:rPr lang="en-US" sz="2800" b="0" i="0" dirty="0">
                 <a:solidFill>
                   <a:srgbClr val="212529"/>
                 </a:solidFill>
@@ -9623,14 +9676,6 @@
               </a:rPr>
               <a:t>JupyterLab</a:t>
             </a:r>
-            <a:endParaRPr lang="en-US" sz="2800" b="0" i="0" dirty="0">
-              <a:solidFill>
-                <a:srgbClr val="212529"/>
-              </a:solidFill>
-              <a:effectLst/>
-              <a:latin typeface="Arial" panose="020B0604020202020204" pitchFamily="34" charset="0"/>
-              <a:cs typeface="Arial" panose="020B0604020202020204" pitchFamily="34" charset="0"/>
-            </a:endParaRPr>
           </a:p>
           <a:p>
             <a:pPr algn="l">
@@ -9641,7 +9686,7 @@
               <a:buChar char="•"/>
             </a:pPr>
             <a:r>
-              <a:rPr lang="en-US" sz="2800" b="0" i="0" dirty="0" err="1">
+              <a:rPr lang="en-US" sz="2800" b="0" i="0" dirty="0">
                 <a:solidFill>
                   <a:srgbClr val="212529"/>
                 </a:solidFill>
@@ -9651,14 +9696,6 @@
               </a:rPr>
               <a:t>VSCode</a:t>
             </a:r>
-            <a:endParaRPr lang="en-US" sz="2800" b="0" i="0" dirty="0">
-              <a:solidFill>
-                <a:srgbClr val="212529"/>
-              </a:solidFill>
-              <a:effectLst/>
-              <a:latin typeface="Arial" panose="020B0604020202020204" pitchFamily="34" charset="0"/>
-              <a:cs typeface="Arial" panose="020B0604020202020204" pitchFamily="34" charset="0"/>
-            </a:endParaRPr>
           </a:p>
         </p:txBody>
       </p:sp>
@@ -9704,7 +9741,7 @@
         </p:nvSpPr>
         <p:spPr>
           <a:xfrm>
-            <a:off x="251521" y="424062"/>
+            <a:off x="35496" y="424062"/>
             <a:ext cx="7632848" cy="2212850"/>
           </a:xfrm>
         </p:spPr>

</xml_diff>